<commit_message>
pptx fix with GPS
</commit_message>
<xml_diff>
--- a/MCU/Validation/SeniorDesignMCUppt.pptx
+++ b/MCU/Validation/SeniorDesignMCUppt.pptx
@@ -270,7 +270,7 @@
           <a:p>
             <a:fld id="{7C7F9163-B267-4438-9ACE-9C6C8A6319F6}" type="datetimeFigureOut">
               <a:rPr lang="en-US" smtClean="0"/>
-              <a:t>4/21/2023</a:t>
+              <a:t>4/23/2023</a:t>
             </a:fld>
             <a:endParaRPr lang="en-US"/>
           </a:p>
@@ -468,7 +468,7 @@
           <a:p>
             <a:fld id="{7C7F9163-B267-4438-9ACE-9C6C8A6319F6}" type="datetimeFigureOut">
               <a:rPr lang="en-US" smtClean="0"/>
-              <a:t>4/21/2023</a:t>
+              <a:t>4/23/2023</a:t>
             </a:fld>
             <a:endParaRPr lang="en-US"/>
           </a:p>
@@ -676,7 +676,7 @@
           <a:p>
             <a:fld id="{7C7F9163-B267-4438-9ACE-9C6C8A6319F6}" type="datetimeFigureOut">
               <a:rPr lang="en-US" smtClean="0"/>
-              <a:t>4/21/2023</a:t>
+              <a:t>4/23/2023</a:t>
             </a:fld>
             <a:endParaRPr lang="en-US"/>
           </a:p>
@@ -874,7 +874,7 @@
           <a:p>
             <a:fld id="{7C7F9163-B267-4438-9ACE-9C6C8A6319F6}" type="datetimeFigureOut">
               <a:rPr lang="en-US" smtClean="0"/>
-              <a:t>4/21/2023</a:t>
+              <a:t>4/23/2023</a:t>
             </a:fld>
             <a:endParaRPr lang="en-US"/>
           </a:p>
@@ -1149,7 +1149,7 @@
           <a:p>
             <a:fld id="{7C7F9163-B267-4438-9ACE-9C6C8A6319F6}" type="datetimeFigureOut">
               <a:rPr lang="en-US" smtClean="0"/>
-              <a:t>4/21/2023</a:t>
+              <a:t>4/23/2023</a:t>
             </a:fld>
             <a:endParaRPr lang="en-US"/>
           </a:p>
@@ -1414,7 +1414,7 @@
           <a:p>
             <a:fld id="{7C7F9163-B267-4438-9ACE-9C6C8A6319F6}" type="datetimeFigureOut">
               <a:rPr lang="en-US" smtClean="0"/>
-              <a:t>4/21/2023</a:t>
+              <a:t>4/23/2023</a:t>
             </a:fld>
             <a:endParaRPr lang="en-US"/>
           </a:p>
@@ -1826,7 +1826,7 @@
           <a:p>
             <a:fld id="{7C7F9163-B267-4438-9ACE-9C6C8A6319F6}" type="datetimeFigureOut">
               <a:rPr lang="en-US" smtClean="0"/>
-              <a:t>4/21/2023</a:t>
+              <a:t>4/23/2023</a:t>
             </a:fld>
             <a:endParaRPr lang="en-US"/>
           </a:p>
@@ -1967,7 +1967,7 @@
           <a:p>
             <a:fld id="{7C7F9163-B267-4438-9ACE-9C6C8A6319F6}" type="datetimeFigureOut">
               <a:rPr lang="en-US" smtClean="0"/>
-              <a:t>4/21/2023</a:t>
+              <a:t>4/23/2023</a:t>
             </a:fld>
             <a:endParaRPr lang="en-US"/>
           </a:p>
@@ -2080,7 +2080,7 @@
           <a:p>
             <a:fld id="{7C7F9163-B267-4438-9ACE-9C6C8A6319F6}" type="datetimeFigureOut">
               <a:rPr lang="en-US" smtClean="0"/>
-              <a:t>4/21/2023</a:t>
+              <a:t>4/23/2023</a:t>
             </a:fld>
             <a:endParaRPr lang="en-US"/>
           </a:p>
@@ -2391,7 +2391,7 @@
           <a:p>
             <a:fld id="{7C7F9163-B267-4438-9ACE-9C6C8A6319F6}" type="datetimeFigureOut">
               <a:rPr lang="en-US" smtClean="0"/>
-              <a:t>4/21/2023</a:t>
+              <a:t>4/23/2023</a:t>
             </a:fld>
             <a:endParaRPr lang="en-US"/>
           </a:p>
@@ -2679,7 +2679,7 @@
           <a:p>
             <a:fld id="{7C7F9163-B267-4438-9ACE-9C6C8A6319F6}" type="datetimeFigureOut">
               <a:rPr lang="en-US" smtClean="0"/>
-              <a:t>4/21/2023</a:t>
+              <a:t>4/23/2023</a:t>
             </a:fld>
             <a:endParaRPr lang="en-US"/>
           </a:p>
@@ -2920,7 +2920,7 @@
           <a:p>
             <a:fld id="{7C7F9163-B267-4438-9ACE-9C6C8A6319F6}" type="datetimeFigureOut">
               <a:rPr lang="en-US" smtClean="0"/>
-              <a:t>4/21/2023</a:t>
+              <a:t>4/23/2023</a:t>
             </a:fld>
             <a:endParaRPr lang="en-US"/>
           </a:p>
@@ -3360,7 +3360,7 @@
           <a:p>
             <a:r>
               <a:rPr lang="en-US" dirty="0"/>
-              <a:t>GPS Error</a:t>
+              <a:t>GPS Difference when compared to iPhone</a:t>
             </a:r>
           </a:p>
         </p:txBody>
@@ -3381,7 +3381,7 @@
             <p:ph idx="1"/>
             <p:extLst>
               <p:ext uri="{D42A27DB-BD31-4B8C-83A1-F6EECF244321}">
-                <p14:modId xmlns:p14="http://schemas.microsoft.com/office/powerpoint/2010/main" val="3507679106"/>
+                <p14:modId xmlns:p14="http://schemas.microsoft.com/office/powerpoint/2010/main" val="3334789844"/>
               </p:ext>
             </p:extLst>
           </p:nvPr>
@@ -3512,7 +3512,7 @@
                     <a:p>
                       <a:r>
                         <a:rPr lang="en-US" dirty="0"/>
-                        <a:t>Error</a:t>
+                        <a:t>Difference</a:t>
                       </a:r>
                     </a:p>
                   </a:txBody>
@@ -3882,6 +3882,74 @@
           </a:prstGeom>
         </p:spPr>
       </p:pic>
+      <p:sp>
+        <p:nvSpPr>
+          <p:cNvPr id="4" name="Title 1">
+            <a:extLst>
+              <a:ext uri="{FF2B5EF4-FFF2-40B4-BE49-F238E27FC236}">
+                <a16:creationId xmlns:a16="http://schemas.microsoft.com/office/drawing/2014/main" id="{08F0E5C4-0DED-4280-D80F-0104F933C11E}"/>
+              </a:ext>
+            </a:extLst>
+          </p:cNvPr>
+          <p:cNvSpPr txBox="1">
+            <a:spLocks/>
+          </p:cNvSpPr>
+          <p:nvPr/>
+        </p:nvSpPr>
+        <p:spPr>
+          <a:xfrm>
+            <a:off x="838200" y="5877658"/>
+            <a:ext cx="10515600" cy="649860"/>
+          </a:xfrm>
+          <a:prstGeom prst="rect">
+            <a:avLst/>
+          </a:prstGeom>
+        </p:spPr>
+        <p:txBody>
+          <a:bodyPr vert="horz" lIns="91440" tIns="45720" rIns="91440" bIns="45720" rtlCol="0" anchor="ctr">
+            <a:normAutofit/>
+          </a:bodyPr>
+          <a:lstStyle>
+            <a:lvl1pPr algn="l" defTabSz="914400" rtl="0" eaLnBrk="1" latinLnBrk="0" hangingPunct="1">
+              <a:lnSpc>
+                <a:spcPct val="90000"/>
+              </a:lnSpc>
+              <a:spcBef>
+                <a:spcPct val="0"/>
+              </a:spcBef>
+              <a:buNone/>
+              <a:defRPr sz="4400" kern="1200">
+                <a:solidFill>
+                  <a:schemeClr val="tx1"/>
+                </a:solidFill>
+                <a:latin typeface="+mj-lt"/>
+                <a:ea typeface="+mj-ea"/>
+                <a:cs typeface="+mj-cs"/>
+              </a:defRPr>
+            </a:lvl1pPr>
+          </a:lstStyle>
+          <a:p>
+            <a:r>
+              <a:rPr lang="en-US" sz="1600" dirty="0"/>
+              <a:t>The iPhone had a much larger error than expected when compared to the GPS location. </a:t>
+            </a:r>
+          </a:p>
+          <a:p>
+            <a:r>
+              <a:rPr lang="en-US" sz="1600" dirty="0"/>
+              <a:t>The </a:t>
+            </a:r>
+            <a:r>
+              <a:rPr lang="en-US" sz="1600" dirty="0" err="1"/>
+              <a:t>Beitian</a:t>
+            </a:r>
+            <a:r>
+              <a:rPr lang="en-US" sz="1600" dirty="0"/>
+              <a:t> BN-280 data sheet claims a 2m error, with 98% of the time it will plot within one meter. </a:t>
+            </a:r>
+          </a:p>
+        </p:txBody>
+      </p:sp>
     </p:spTree>
     <p:extLst>
       <p:ext uri="{BB962C8B-B14F-4D97-AF65-F5344CB8AC3E}">
@@ -5708,15 +5776,6 @@
 </file>
 
 <file path=customXml/item2.xml><?xml version="1.0" encoding="utf-8"?>
-<?mso-contentType ?>
-<FormTemplates xmlns="http://schemas.microsoft.com/sharepoint/v3/contenttype/forms">
-  <Display>DocumentLibraryForm</Display>
-  <Edit>DocumentLibraryForm</Edit>
-  <New>DocumentLibraryForm</New>
-</FormTemplates>
-</file>
-
-<file path=customXml/item3.xml><?xml version="1.0" encoding="utf-8"?>
 <ct:contentTypeSchema xmlns:ct="http://schemas.microsoft.com/office/2006/metadata/contentType" xmlns:ma="http://schemas.microsoft.com/office/2006/metadata/properties/metaAttributes" ct:_="" ma:_="" ma:contentTypeName="Document" ma:contentTypeID="0x010100B29C91E17D04934695793C933280E790" ma:contentTypeVersion="2" ma:contentTypeDescription="Create a new document." ma:contentTypeScope="" ma:versionID="afe2d92cfa24a80742cd0306212fe1f0">
   <xsd:schema xmlns:xsd="http://www.w3.org/2001/XMLSchema" xmlns:xs="http://www.w3.org/2001/XMLSchema" xmlns:p="http://schemas.microsoft.com/office/2006/metadata/properties" xmlns:ns3="af27dc83-2ff2-4cf0-bd42-7e3194846397" targetNamespace="http://schemas.microsoft.com/office/2006/metadata/properties" ma:root="true" ma:fieldsID="67b4fdb90cd18eb0b81457881996c16d" ns3:_="">
     <xsd:import namespace="af27dc83-2ff2-4cf0-bd42-7e3194846397"/>
@@ -5848,6 +5907,15 @@
 </ct:contentTypeSchema>
 </file>
 
+<file path=customXml/item3.xml><?xml version="1.0" encoding="utf-8"?>
+<?mso-contentType ?>
+<FormTemplates xmlns="http://schemas.microsoft.com/sharepoint/v3/contenttype/forms">
+  <Display>DocumentLibraryForm</Display>
+  <Edit>DocumentLibraryForm</Edit>
+  <New>DocumentLibraryForm</New>
+</FormTemplates>
+</file>
+
 <file path=customXml/itemProps1.xml><?xml version="1.0" encoding="utf-8"?>
 <ds:datastoreItem xmlns:ds="http://schemas.openxmlformats.org/officeDocument/2006/customXml" ds:itemID="{F34206BA-C3B4-4526-B763-0B3D3E54D609}">
   <ds:schemaRefs>
@@ -5865,14 +5933,6 @@
 </file>
 
 <file path=customXml/itemProps2.xml><?xml version="1.0" encoding="utf-8"?>
-<ds:datastoreItem xmlns:ds="http://schemas.openxmlformats.org/officeDocument/2006/customXml" ds:itemID="{FD64AAD9-FC70-4F8C-882A-B420CE39846B}">
-  <ds:schemaRefs>
-    <ds:schemaRef ds:uri="http://schemas.microsoft.com/sharepoint/v3/contenttype/forms"/>
-  </ds:schemaRefs>
-</ds:datastoreItem>
-</file>
-
-<file path=customXml/itemProps3.xml><?xml version="1.0" encoding="utf-8"?>
 <ds:datastoreItem xmlns:ds="http://schemas.openxmlformats.org/officeDocument/2006/customXml" ds:itemID="{3F9F5415-B49F-44CC-8D3E-57E3E1B19F82}">
   <ds:schemaRefs>
     <ds:schemaRef ds:uri="http://schemas.microsoft.com/office/2006/metadata/contentType"/>
@@ -5888,4 +5948,12 @@
     <ds:schemaRef ds:uri="http://schemas.microsoft.com/internal/obd"/>
   </ds:schemaRefs>
 </ds:datastoreItem>
+</file>
+
+<file path=customXml/itemProps3.xml><?xml version="1.0" encoding="utf-8"?>
+<ds:datastoreItem xmlns:ds="http://schemas.openxmlformats.org/officeDocument/2006/customXml" ds:itemID="{FD64AAD9-FC70-4F8C-882A-B420CE39846B}">
+  <ds:schemaRefs>
+    <ds:schemaRef ds:uri="http://schemas.microsoft.com/sharepoint/v3/contenttype/forms"/>
+  </ds:schemaRefs>
+</ds:datastoreItem>
 </file>
</xml_diff>